<commit_message>
Icon update + "About Window" added
</commit_message>
<xml_diff>
--- a/ImageResources/ProjectFiles/logo.pptx
+++ b/ImageResources/ProjectFiles/logo.pptx
@@ -6,6 +6,7 @@
   </p:sldMasterIdLst>
   <p:sldIdLst>
     <p:sldId id="257" r:id="rId2"/>
+    <p:sldId id="258" r:id="rId3"/>
   </p:sldIdLst>
   <p:sldSz cx="9525000" cy="9525000"/>
   <p:notesSz cx="6858000" cy="9144000"/>
@@ -261,7 +262,7 @@
                 </a:solidFill>
               </a:rPr>
               <a:pPr/>
-              <a:t>22.09.2017</a:t>
+              <a:t>02.10.2017</a:t>
             </a:fld>
             <a:endParaRPr lang="de-DE">
               <a:solidFill>
@@ -463,7 +464,7 @@
                 </a:solidFill>
               </a:rPr>
               <a:pPr/>
-              <a:t>22.09.2017</a:t>
+              <a:t>02.10.2017</a:t>
             </a:fld>
             <a:endParaRPr lang="de-DE">
               <a:solidFill>
@@ -675,7 +676,7 @@
                 </a:solidFill>
               </a:rPr>
               <a:pPr/>
-              <a:t>22.09.2017</a:t>
+              <a:t>02.10.2017</a:t>
             </a:fld>
             <a:endParaRPr lang="de-DE">
               <a:solidFill>
@@ -877,7 +878,7 @@
                 </a:solidFill>
               </a:rPr>
               <a:pPr/>
-              <a:t>22.09.2017</a:t>
+              <a:t>02.10.2017</a:t>
             </a:fld>
             <a:endParaRPr lang="de-DE">
               <a:solidFill>
@@ -1153,7 +1154,7 @@
                 </a:solidFill>
               </a:rPr>
               <a:pPr/>
-              <a:t>22.09.2017</a:t>
+              <a:t>02.10.2017</a:t>
             </a:fld>
             <a:endParaRPr lang="de-DE">
               <a:solidFill>
@@ -1417,7 +1418,7 @@
                 </a:solidFill>
               </a:rPr>
               <a:pPr/>
-              <a:t>22.09.2017</a:t>
+              <a:t>02.10.2017</a:t>
             </a:fld>
             <a:endParaRPr lang="de-DE">
               <a:solidFill>
@@ -1816,7 +1817,7 @@
                 </a:solidFill>
               </a:rPr>
               <a:pPr/>
-              <a:t>22.09.2017</a:t>
+              <a:t>02.10.2017</a:t>
             </a:fld>
             <a:endParaRPr lang="de-DE">
               <a:solidFill>
@@ -1966,7 +1967,7 @@
                 </a:solidFill>
               </a:rPr>
               <a:pPr/>
-              <a:t>22.09.2017</a:t>
+              <a:t>02.10.2017</a:t>
             </a:fld>
             <a:endParaRPr lang="de-DE">
               <a:solidFill>
@@ -2093,7 +2094,7 @@
                 </a:solidFill>
               </a:rPr>
               <a:pPr/>
-              <a:t>22.09.2017</a:t>
+              <a:t>02.10.2017</a:t>
             </a:fld>
             <a:endParaRPr lang="de-DE">
               <a:solidFill>
@@ -2402,7 +2403,7 @@
                 </a:solidFill>
               </a:rPr>
               <a:pPr/>
-              <a:t>22.09.2017</a:t>
+              <a:t>02.10.2017</a:t>
             </a:fld>
             <a:endParaRPr lang="de-DE">
               <a:solidFill>
@@ -2691,7 +2692,7 @@
                 </a:solidFill>
               </a:rPr>
               <a:pPr/>
-              <a:t>22.09.2017</a:t>
+              <a:t>02.10.2017</a:t>
             </a:fld>
             <a:endParaRPr lang="de-DE">
               <a:solidFill>
@@ -2937,7 +2938,7 @@
                 </a:solidFill>
               </a:rPr>
               <a:pPr defTabSz="403228"/>
-              <a:t>22.09.2017</a:t>
+              <a:t>02.10.2017</a:t>
             </a:fld>
             <a:endParaRPr lang="de-DE">
               <a:solidFill>
@@ -3826,6 +3827,729 @@
 </p:sld>
 </file>
 
+<file path=ppt/slides/slide2.xml><?xml version="1.0" encoding="utf-8"?>
+<p:sld xmlns:a="http://schemas.openxmlformats.org/drawingml/2006/main" xmlns:r="http://schemas.openxmlformats.org/officeDocument/2006/relationships" xmlns:p="http://schemas.openxmlformats.org/presentationml/2006/main">
+  <p:cSld>
+    <p:spTree>
+      <p:nvGrpSpPr>
+        <p:cNvPr id="1" name=""/>
+        <p:cNvGrpSpPr/>
+        <p:nvPr/>
+      </p:nvGrpSpPr>
+      <p:grpSpPr>
+        <a:xfrm>
+          <a:off x="0" y="0"/>
+          <a:ext cx="0" cy="0"/>
+          <a:chOff x="0" y="0"/>
+          <a:chExt cx="0" cy="0"/>
+        </a:xfrm>
+      </p:grpSpPr>
+      <p:sp>
+        <p:nvSpPr>
+          <p:cNvPr id="15" name="Freihandform 14"/>
+          <p:cNvSpPr/>
+          <p:nvPr/>
+        </p:nvSpPr>
+        <p:spPr>
+          <a:xfrm>
+            <a:off x="-107" y="-105"/>
+            <a:ext cx="9525212" cy="9525210"/>
+          </a:xfrm>
+          <a:custGeom>
+            <a:avLst/>
+            <a:gdLst>
+              <a:gd name="connsiteX0" fmla="*/ 4762606 w 9525212"/>
+              <a:gd name="connsiteY0" fmla="*/ 0 h 9525210"/>
+              <a:gd name="connsiteX1" fmla="*/ 9525212 w 9525212"/>
+              <a:gd name="connsiteY1" fmla="*/ 4762605 h 9525210"/>
+              <a:gd name="connsiteX2" fmla="*/ 4762606 w 9525212"/>
+              <a:gd name="connsiteY2" fmla="*/ 9525210 h 9525210"/>
+              <a:gd name="connsiteX3" fmla="*/ 2697819 w 9525212"/>
+              <a:gd name="connsiteY3" fmla="*/ 9055565 h 9525210"/>
+              <a:gd name="connsiteX4" fmla="*/ 2643938 w 9525212"/>
+              <a:gd name="connsiteY4" fmla="*/ 9027969 h 9525210"/>
+              <a:gd name="connsiteX5" fmla="*/ 2828643 w 9525212"/>
+              <a:gd name="connsiteY5" fmla="*/ 8823197 h 9525210"/>
+              <a:gd name="connsiteX6" fmla="*/ 4635462 w 9525212"/>
+              <a:gd name="connsiteY6" fmla="*/ 6818082 h 9525210"/>
+              <a:gd name="connsiteX7" fmla="*/ 4689269 w 9525212"/>
+              <a:gd name="connsiteY7" fmla="*/ 6866224 h 9525210"/>
+              <a:gd name="connsiteX8" fmla="*/ 5185514 w 9525212"/>
+              <a:gd name="connsiteY8" fmla="*/ 6838650 h 9525210"/>
+              <a:gd name="connsiteX9" fmla="*/ 5241471 w 9525212"/>
+              <a:gd name="connsiteY9" fmla="*/ 6454202 h 9525210"/>
+              <a:gd name="connsiteX10" fmla="*/ 5232236 w 9525212"/>
+              <a:gd name="connsiteY10" fmla="*/ 6438792 h 9525210"/>
+              <a:gd name="connsiteX11" fmla="*/ 5236905 w 9525212"/>
+              <a:gd name="connsiteY11" fmla="*/ 6438532 h 9525210"/>
+              <a:gd name="connsiteX12" fmla="*/ 6735474 w 9525212"/>
+              <a:gd name="connsiteY12" fmla="*/ 4763630 h 9525210"/>
+              <a:gd name="connsiteX13" fmla="*/ 6208385 w 9525212"/>
+              <a:gd name="connsiteY13" fmla="*/ 3667460 h 9525210"/>
+              <a:gd name="connsiteX14" fmla="*/ 5223259 w 9525212"/>
+              <a:gd name="connsiteY14" fmla="*/ 3264239 h 9525210"/>
+              <a:gd name="connsiteX15" fmla="*/ 5060569 w 9525212"/>
+              <a:gd name="connsiteY15" fmla="*/ 3265060 h 9525210"/>
+              <a:gd name="connsiteX16" fmla="*/ 3562001 w 9525212"/>
+              <a:gd name="connsiteY16" fmla="*/ 4939964 h 9525210"/>
+              <a:gd name="connsiteX17" fmla="*/ 3562260 w 9525212"/>
+              <a:gd name="connsiteY17" fmla="*/ 4944634 h 9525210"/>
+              <a:gd name="connsiteX18" fmla="*/ 3545925 w 9525212"/>
+              <a:gd name="connsiteY18" fmla="*/ 4937165 h 9525210"/>
+              <a:gd name="connsiteX19" fmla="*/ 3170040 w 9525212"/>
+              <a:gd name="connsiteY19" fmla="*/ 5035370 h 9525210"/>
+              <a:gd name="connsiteX20" fmla="*/ 3197616 w 9525212"/>
+              <a:gd name="connsiteY20" fmla="*/ 5531614 h 9525210"/>
+              <a:gd name="connsiteX21" fmla="*/ 3251423 w 9525212"/>
+              <a:gd name="connsiteY21" fmla="*/ 5579758 h 9525210"/>
+              <a:gd name="connsiteX22" fmla="*/ 1178297 w 9525212"/>
+              <a:gd name="connsiteY22" fmla="*/ 7896829 h 9525210"/>
+              <a:gd name="connsiteX23" fmla="*/ 1087548 w 9525212"/>
+              <a:gd name="connsiteY23" fmla="*/ 7792064 h 9525210"/>
+              <a:gd name="connsiteX24" fmla="*/ 0 w 9525212"/>
+              <a:gd name="connsiteY24" fmla="*/ 4762605 h 9525210"/>
+              <a:gd name="connsiteX25" fmla="*/ 4762606 w 9525212"/>
+              <a:gd name="connsiteY25" fmla="*/ 0 h 9525210"/>
+            </a:gdLst>
+            <a:ahLst/>
+            <a:cxnLst>
+              <a:cxn ang="0">
+                <a:pos x="connsiteX0" y="connsiteY0"/>
+              </a:cxn>
+              <a:cxn ang="0">
+                <a:pos x="connsiteX1" y="connsiteY1"/>
+              </a:cxn>
+              <a:cxn ang="0">
+                <a:pos x="connsiteX2" y="connsiteY2"/>
+              </a:cxn>
+              <a:cxn ang="0">
+                <a:pos x="connsiteX3" y="connsiteY3"/>
+              </a:cxn>
+              <a:cxn ang="0">
+                <a:pos x="connsiteX4" y="connsiteY4"/>
+              </a:cxn>
+              <a:cxn ang="0">
+                <a:pos x="connsiteX5" y="connsiteY5"/>
+              </a:cxn>
+              <a:cxn ang="0">
+                <a:pos x="connsiteX6" y="connsiteY6"/>
+              </a:cxn>
+              <a:cxn ang="0">
+                <a:pos x="connsiteX7" y="connsiteY7"/>
+              </a:cxn>
+              <a:cxn ang="0">
+                <a:pos x="connsiteX8" y="connsiteY8"/>
+              </a:cxn>
+              <a:cxn ang="0">
+                <a:pos x="connsiteX9" y="connsiteY9"/>
+              </a:cxn>
+              <a:cxn ang="0">
+                <a:pos x="connsiteX10" y="connsiteY10"/>
+              </a:cxn>
+              <a:cxn ang="0">
+                <a:pos x="connsiteX11" y="connsiteY11"/>
+              </a:cxn>
+              <a:cxn ang="0">
+                <a:pos x="connsiteX12" y="connsiteY12"/>
+              </a:cxn>
+              <a:cxn ang="0">
+                <a:pos x="connsiteX13" y="connsiteY13"/>
+              </a:cxn>
+              <a:cxn ang="0">
+                <a:pos x="connsiteX14" y="connsiteY14"/>
+              </a:cxn>
+              <a:cxn ang="0">
+                <a:pos x="connsiteX15" y="connsiteY15"/>
+              </a:cxn>
+              <a:cxn ang="0">
+                <a:pos x="connsiteX16" y="connsiteY16"/>
+              </a:cxn>
+              <a:cxn ang="0">
+                <a:pos x="connsiteX17" y="connsiteY17"/>
+              </a:cxn>
+              <a:cxn ang="0">
+                <a:pos x="connsiteX18" y="connsiteY18"/>
+              </a:cxn>
+              <a:cxn ang="0">
+                <a:pos x="connsiteX19" y="connsiteY19"/>
+              </a:cxn>
+              <a:cxn ang="0">
+                <a:pos x="connsiteX20" y="connsiteY20"/>
+              </a:cxn>
+              <a:cxn ang="0">
+                <a:pos x="connsiteX21" y="connsiteY21"/>
+              </a:cxn>
+              <a:cxn ang="0">
+                <a:pos x="connsiteX22" y="connsiteY22"/>
+              </a:cxn>
+              <a:cxn ang="0">
+                <a:pos x="connsiteX23" y="connsiteY23"/>
+              </a:cxn>
+              <a:cxn ang="0">
+                <a:pos x="connsiteX24" y="connsiteY24"/>
+              </a:cxn>
+              <a:cxn ang="0">
+                <a:pos x="connsiteX25" y="connsiteY25"/>
+              </a:cxn>
+            </a:cxnLst>
+            <a:rect l="l" t="t" r="r" b="b"/>
+            <a:pathLst>
+              <a:path w="9525212" h="9525210">
+                <a:moveTo>
+                  <a:pt x="4762606" y="0"/>
+                </a:moveTo>
+                <a:cubicBezTo>
+                  <a:pt x="7392921" y="0"/>
+                  <a:pt x="9525212" y="2132291"/>
+                  <a:pt x="9525212" y="4762605"/>
+                </a:cubicBezTo>
+                <a:cubicBezTo>
+                  <a:pt x="9525212" y="7392919"/>
+                  <a:pt x="7392921" y="9525210"/>
+                  <a:pt x="4762606" y="9525210"/>
+                </a:cubicBezTo>
+                <a:cubicBezTo>
+                  <a:pt x="4022830" y="9525210"/>
+                  <a:pt x="3322448" y="9356542"/>
+                  <a:pt x="2697819" y="9055565"/>
+                </a:cubicBezTo>
+                <a:lnTo>
+                  <a:pt x="2643938" y="9027969"/>
+                </a:lnTo>
+                <a:lnTo>
+                  <a:pt x="2828643" y="8823197"/>
+                </a:lnTo>
+                <a:cubicBezTo>
+                  <a:pt x="3495701" y="8083872"/>
+                  <a:pt x="4245853" y="7253537"/>
+                  <a:pt x="4635462" y="6818082"/>
+                </a:cubicBezTo>
+                <a:lnTo>
+                  <a:pt x="4689269" y="6866224"/>
+                </a:lnTo>
+                <a:cubicBezTo>
+                  <a:pt x="4833917" y="6995643"/>
+                  <a:pt x="5056095" y="6983298"/>
+                  <a:pt x="5185514" y="6838650"/>
+                </a:cubicBezTo>
+                <a:cubicBezTo>
+                  <a:pt x="5282578" y="6730163"/>
+                  <a:pt x="5299901" y="6578068"/>
+                  <a:pt x="5241471" y="6454202"/>
+                </a:cubicBezTo>
+                <a:lnTo>
+                  <a:pt x="5232236" y="6438792"/>
+                </a:lnTo>
+                <a:lnTo>
+                  <a:pt x="5236905" y="6438532"/>
+                </a:lnTo>
+                <a:cubicBezTo>
+                  <a:pt x="6113237" y="6389839"/>
+                  <a:pt x="6784169" y="5639960"/>
+                  <a:pt x="6735474" y="4763630"/>
+                </a:cubicBezTo>
+                <a:cubicBezTo>
+                  <a:pt x="6711127" y="4325462"/>
+                  <a:pt x="6511483" y="3938649"/>
+                  <a:pt x="6208385" y="3667460"/>
+                </a:cubicBezTo>
+                <a:cubicBezTo>
+                  <a:pt x="5943174" y="3430171"/>
+                  <a:pt x="5598756" y="3281410"/>
+                  <a:pt x="5223259" y="3264239"/>
+                </a:cubicBezTo>
+                <a:cubicBezTo>
+                  <a:pt x="5169617" y="3261785"/>
+                  <a:pt x="5115339" y="3262017"/>
+                  <a:pt x="5060569" y="3265060"/>
+                </a:cubicBezTo>
+                <a:cubicBezTo>
+                  <a:pt x="4184239" y="3313754"/>
+                  <a:pt x="3513305" y="4063633"/>
+                  <a:pt x="3562001" y="4939964"/>
+                </a:cubicBezTo>
+                <a:lnTo>
+                  <a:pt x="3562260" y="4944634"/>
+                </a:lnTo>
+                <a:lnTo>
+                  <a:pt x="3545925" y="4937165"/>
+                </a:lnTo>
+                <a:cubicBezTo>
+                  <a:pt x="3416347" y="4892817"/>
+                  <a:pt x="3267106" y="4926884"/>
+                  <a:pt x="3170040" y="5035370"/>
+                </a:cubicBezTo>
+                <a:cubicBezTo>
+                  <a:pt x="3040622" y="5180018"/>
+                  <a:pt x="3052968" y="5402195"/>
+                  <a:pt x="3197616" y="5531614"/>
+                </a:cubicBezTo>
+                <a:lnTo>
+                  <a:pt x="3251423" y="5579758"/>
+                </a:lnTo>
+                <a:lnTo>
+                  <a:pt x="1178297" y="7896829"/>
+                </a:lnTo>
+                <a:lnTo>
+                  <a:pt x="1087548" y="7792064"/>
+                </a:lnTo>
+                <a:cubicBezTo>
+                  <a:pt x="408134" y="6968805"/>
+                  <a:pt x="0" y="5913368"/>
+                  <a:pt x="0" y="4762605"/>
+                </a:cubicBezTo>
+                <a:cubicBezTo>
+                  <a:pt x="0" y="2132291"/>
+                  <a:pt x="2132291" y="0"/>
+                  <a:pt x="4762606" y="0"/>
+                </a:cubicBezTo>
+                <a:close/>
+              </a:path>
+            </a:pathLst>
+          </a:custGeom>
+          <a:solidFill>
+            <a:schemeClr val="tx1"/>
+          </a:solidFill>
+          <a:ln>
+            <a:noFill/>
+          </a:ln>
+        </p:spPr>
+        <p:style>
+          <a:lnRef idx="2">
+            <a:schemeClr val="accent1">
+              <a:shade val="50000"/>
+            </a:schemeClr>
+          </a:lnRef>
+          <a:fillRef idx="1">
+            <a:schemeClr val="accent1"/>
+          </a:fillRef>
+          <a:effectRef idx="0">
+            <a:schemeClr val="accent1"/>
+          </a:effectRef>
+          <a:fontRef idx="minor">
+            <a:schemeClr val="lt1"/>
+          </a:fontRef>
+        </p:style>
+        <p:txBody>
+          <a:bodyPr wrap="square" rtlCol="0" anchor="ctr">
+            <a:noAutofit/>
+          </a:bodyPr>
+          <a:lstStyle/>
+          <a:p>
+            <a:pPr algn="ctr" defTabSz="403228"/>
+            <a:endParaRPr lang="de-DE" sz="1588">
+              <a:solidFill>
+                <a:prstClr val="white"/>
+              </a:solidFill>
+            </a:endParaRPr>
+          </a:p>
+        </p:txBody>
+      </p:sp>
+      <p:sp>
+        <p:nvSpPr>
+          <p:cNvPr id="4" name="Rechteck 3"/>
+          <p:cNvSpPr/>
+          <p:nvPr/>
+        </p:nvSpPr>
+        <p:spPr>
+          <a:xfrm>
+            <a:off x="1" y="1"/>
+            <a:ext cx="9525000" cy="9525000"/>
+          </a:xfrm>
+          <a:prstGeom prst="rect">
+            <a:avLst/>
+          </a:prstGeom>
+          <a:noFill/>
+          <a:ln>
+            <a:noFill/>
+          </a:ln>
+        </p:spPr>
+        <p:style>
+          <a:lnRef idx="2">
+            <a:schemeClr val="accent1">
+              <a:shade val="50000"/>
+            </a:schemeClr>
+          </a:lnRef>
+          <a:fillRef idx="1">
+            <a:schemeClr val="accent1"/>
+          </a:fillRef>
+          <a:effectRef idx="0">
+            <a:schemeClr val="accent1"/>
+          </a:effectRef>
+          <a:fontRef idx="minor">
+            <a:schemeClr val="lt1"/>
+          </a:fontRef>
+        </p:style>
+        <p:txBody>
+          <a:bodyPr rtlCol="0" anchor="ctr"/>
+          <a:lstStyle/>
+          <a:p>
+            <a:pPr algn="ctr" defTabSz="403228"/>
+            <a:endParaRPr lang="de-DE" sz="1588">
+              <a:solidFill>
+                <a:prstClr val="white"/>
+              </a:solidFill>
+            </a:endParaRPr>
+          </a:p>
+        </p:txBody>
+      </p:sp>
+      <p:sp>
+        <p:nvSpPr>
+          <p:cNvPr id="33" name="Rechteck: abgerundete Ecken 32"/>
+          <p:cNvSpPr>
+            <a:spLocks noChangeAspect="1"/>
+          </p:cNvSpPr>
+          <p:nvPr/>
+        </p:nvSpPr>
+        <p:spPr>
+          <a:xfrm>
+            <a:off x="879823" y="879823"/>
+            <a:ext cx="7765356" cy="7765356"/>
+          </a:xfrm>
+          <a:prstGeom prst="ellipse">
+            <a:avLst/>
+          </a:prstGeom>
+          <a:gradFill flip="none" rotWithShape="1">
+            <a:gsLst>
+              <a:gs pos="0">
+                <a:srgbClr val="C00000"/>
+              </a:gs>
+              <a:gs pos="23000">
+                <a:schemeClr val="accent2"/>
+              </a:gs>
+              <a:gs pos="32952">
+                <a:schemeClr val="accent4"/>
+              </a:gs>
+              <a:gs pos="52532">
+                <a:srgbClr val="00B050"/>
+              </a:gs>
+              <a:gs pos="69000">
+                <a:srgbClr val="00B0F0"/>
+              </a:gs>
+              <a:gs pos="81183">
+                <a:srgbClr val="002060"/>
+              </a:gs>
+              <a:gs pos="100000">
+                <a:srgbClr val="7030A0"/>
+              </a:gs>
+            </a:gsLst>
+            <a:lin ang="2700000" scaled="1"/>
+            <a:tileRect/>
+          </a:gradFill>
+          <a:ln>
+            <a:noFill/>
+          </a:ln>
+        </p:spPr>
+        <p:style>
+          <a:lnRef idx="2">
+            <a:schemeClr val="accent1">
+              <a:shade val="50000"/>
+            </a:schemeClr>
+          </a:lnRef>
+          <a:fillRef idx="1">
+            <a:schemeClr val="accent1"/>
+          </a:fillRef>
+          <a:effectRef idx="0">
+            <a:schemeClr val="accent1"/>
+          </a:effectRef>
+          <a:fontRef idx="minor">
+            <a:schemeClr val="lt1"/>
+          </a:fontRef>
+        </p:style>
+        <p:txBody>
+          <a:bodyPr rtlCol="0" anchor="ctr"/>
+          <a:lstStyle/>
+          <a:p>
+            <a:pPr algn="ctr" defTabSz="403228"/>
+            <a:endParaRPr lang="de-DE" sz="1588" dirty="0">
+              <a:solidFill>
+                <a:prstClr val="white"/>
+              </a:solidFill>
+            </a:endParaRPr>
+          </a:p>
+        </p:txBody>
+      </p:sp>
+      <p:sp>
+        <p:nvSpPr>
+          <p:cNvPr id="7" name="Freihandform 6"/>
+          <p:cNvSpPr/>
+          <p:nvPr/>
+        </p:nvSpPr>
+        <p:spPr>
+          <a:xfrm>
+            <a:off x="936869" y="3262463"/>
+            <a:ext cx="5800990" cy="6022144"/>
+          </a:xfrm>
+          <a:custGeom>
+            <a:avLst/>
+            <a:gdLst>
+              <a:gd name="connsiteX0" fmla="*/ 4845092 w 6557273"/>
+              <a:gd name="connsiteY0" fmla="*/ 1888 h 6807260"/>
+              <a:gd name="connsiteX1" fmla="*/ 5958651 w 6557273"/>
+              <a:gd name="connsiteY1" fmla="*/ 457678 h 6807260"/>
+              <a:gd name="connsiteX2" fmla="*/ 6554457 w 6557273"/>
+              <a:gd name="connsiteY2" fmla="*/ 1696757 h 6807260"/>
+              <a:gd name="connsiteX3" fmla="*/ 4860518 w 6557273"/>
+              <a:gd name="connsiteY3" fmla="*/ 3590019 h 6807260"/>
+              <a:gd name="connsiteX4" fmla="*/ 4855240 w 6557273"/>
+              <a:gd name="connsiteY4" fmla="*/ 3590313 h 6807260"/>
+              <a:gd name="connsiteX5" fmla="*/ 4865679 w 6557273"/>
+              <a:gd name="connsiteY5" fmla="*/ 3607732 h 6807260"/>
+              <a:gd name="connsiteX6" fmla="*/ 4802426 w 6557273"/>
+              <a:gd name="connsiteY6" fmla="*/ 4042301 h 6807260"/>
+              <a:gd name="connsiteX7" fmla="*/ 4241485 w 6557273"/>
+              <a:gd name="connsiteY7" fmla="*/ 4073470 h 6807260"/>
+              <a:gd name="connsiteX8" fmla="*/ 4180664 w 6557273"/>
+              <a:gd name="connsiteY8" fmla="*/ 4019052 h 6807260"/>
+              <a:gd name="connsiteX9" fmla="*/ 1822347 w 6557273"/>
+              <a:gd name="connsiteY9" fmla="*/ 6635841 h 6807260"/>
+              <a:gd name="connsiteX10" fmla="*/ 1667815 w 6557273"/>
+              <a:gd name="connsiteY10" fmla="*/ 6807260 h 6807260"/>
+              <a:gd name="connsiteX11" fmla="*/ 1453812 w 6557273"/>
+              <a:gd name="connsiteY11" fmla="*/ 6697654 h 6807260"/>
+              <a:gd name="connsiteX12" fmla="*/ 34941 w 6557273"/>
+              <a:gd name="connsiteY12" fmla="*/ 5583655 h 6807260"/>
+              <a:gd name="connsiteX13" fmla="*/ 0 w 6557273"/>
+              <a:gd name="connsiteY13" fmla="*/ 5543318 h 6807260"/>
+              <a:gd name="connsiteX14" fmla="*/ 2616186 w 6557273"/>
+              <a:gd name="connsiteY14" fmla="*/ 2619285 h 6807260"/>
+              <a:gd name="connsiteX15" fmla="*/ 2555363 w 6557273"/>
+              <a:gd name="connsiteY15" fmla="*/ 2564865 h 6807260"/>
+              <a:gd name="connsiteX16" fmla="*/ 2524193 w 6557273"/>
+              <a:gd name="connsiteY16" fmla="*/ 2003925 h 6807260"/>
+              <a:gd name="connsiteX17" fmla="*/ 2949082 w 6557273"/>
+              <a:gd name="connsiteY17" fmla="*/ 1892917 h 6807260"/>
+              <a:gd name="connsiteX18" fmla="*/ 2967547 w 6557273"/>
+              <a:gd name="connsiteY18" fmla="*/ 1901359 h 6807260"/>
+              <a:gd name="connsiteX19" fmla="*/ 2967254 w 6557273"/>
+              <a:gd name="connsiteY19" fmla="*/ 1896081 h 6807260"/>
+              <a:gd name="connsiteX20" fmla="*/ 4661193 w 6557273"/>
+              <a:gd name="connsiteY20" fmla="*/ 2817 h 6807260"/>
+              <a:gd name="connsiteX21" fmla="*/ 4845092 w 6557273"/>
+              <a:gd name="connsiteY21" fmla="*/ 1888 h 6807260"/>
+            </a:gdLst>
+            <a:ahLst/>
+            <a:cxnLst>
+              <a:cxn ang="0">
+                <a:pos x="connsiteX0" y="connsiteY0"/>
+              </a:cxn>
+              <a:cxn ang="0">
+                <a:pos x="connsiteX1" y="connsiteY1"/>
+              </a:cxn>
+              <a:cxn ang="0">
+                <a:pos x="connsiteX2" y="connsiteY2"/>
+              </a:cxn>
+              <a:cxn ang="0">
+                <a:pos x="connsiteX3" y="connsiteY3"/>
+              </a:cxn>
+              <a:cxn ang="0">
+                <a:pos x="connsiteX4" y="connsiteY4"/>
+              </a:cxn>
+              <a:cxn ang="0">
+                <a:pos x="connsiteX5" y="connsiteY5"/>
+              </a:cxn>
+              <a:cxn ang="0">
+                <a:pos x="connsiteX6" y="connsiteY6"/>
+              </a:cxn>
+              <a:cxn ang="0">
+                <a:pos x="connsiteX7" y="connsiteY7"/>
+              </a:cxn>
+              <a:cxn ang="0">
+                <a:pos x="connsiteX8" y="connsiteY8"/>
+              </a:cxn>
+              <a:cxn ang="0">
+                <a:pos x="connsiteX9" y="connsiteY9"/>
+              </a:cxn>
+              <a:cxn ang="0">
+                <a:pos x="connsiteX10" y="connsiteY10"/>
+              </a:cxn>
+              <a:cxn ang="0">
+                <a:pos x="connsiteX11" y="connsiteY11"/>
+              </a:cxn>
+              <a:cxn ang="0">
+                <a:pos x="connsiteX12" y="connsiteY12"/>
+              </a:cxn>
+              <a:cxn ang="0">
+                <a:pos x="connsiteX13" y="connsiteY13"/>
+              </a:cxn>
+              <a:cxn ang="0">
+                <a:pos x="connsiteX14" y="connsiteY14"/>
+              </a:cxn>
+              <a:cxn ang="0">
+                <a:pos x="connsiteX15" y="connsiteY15"/>
+              </a:cxn>
+              <a:cxn ang="0">
+                <a:pos x="connsiteX16" y="connsiteY16"/>
+              </a:cxn>
+              <a:cxn ang="0">
+                <a:pos x="connsiteX17" y="connsiteY17"/>
+              </a:cxn>
+              <a:cxn ang="0">
+                <a:pos x="connsiteX18" y="connsiteY18"/>
+              </a:cxn>
+              <a:cxn ang="0">
+                <a:pos x="connsiteX19" y="connsiteY19"/>
+              </a:cxn>
+              <a:cxn ang="0">
+                <a:pos x="connsiteX20" y="connsiteY20"/>
+              </a:cxn>
+              <a:cxn ang="0">
+                <a:pos x="connsiteX21" y="connsiteY21"/>
+              </a:cxn>
+            </a:cxnLst>
+            <a:rect l="l" t="t" r="r" b="b"/>
+            <a:pathLst>
+              <a:path w="6557273" h="6807260">
+                <a:moveTo>
+                  <a:pt x="4845092" y="1888"/>
+                </a:moveTo>
+                <a:cubicBezTo>
+                  <a:pt x="5269544" y="21298"/>
+                  <a:pt x="5658864" y="189453"/>
+                  <a:pt x="5958651" y="457678"/>
+                </a:cubicBezTo>
+                <a:cubicBezTo>
+                  <a:pt x="6301264" y="764222"/>
+                  <a:pt x="6526936" y="1201465"/>
+                  <a:pt x="6554457" y="1696757"/>
+                </a:cubicBezTo>
+                <a:cubicBezTo>
+                  <a:pt x="6609500" y="2687336"/>
+                  <a:pt x="5851098" y="3534978"/>
+                  <a:pt x="4860518" y="3590019"/>
+                </a:cubicBezTo>
+                <a:lnTo>
+                  <a:pt x="4855240" y="3590313"/>
+                </a:lnTo>
+                <a:lnTo>
+                  <a:pt x="4865679" y="3607732"/>
+                </a:lnTo>
+                <a:cubicBezTo>
+                  <a:pt x="4931726" y="3747747"/>
+                  <a:pt x="4912145" y="3919671"/>
+                  <a:pt x="4802426" y="4042301"/>
+                </a:cubicBezTo>
+                <a:cubicBezTo>
+                  <a:pt x="4656135" y="4205807"/>
+                  <a:pt x="4404992" y="4219762"/>
+                  <a:pt x="4241485" y="4073470"/>
+                </a:cubicBezTo>
+                <a:lnTo>
+                  <a:pt x="4180664" y="4019052"/>
+                </a:lnTo>
+                <a:cubicBezTo>
+                  <a:pt x="3677346" y="4581596"/>
+                  <a:pt x="2641722" y="5727141"/>
+                  <a:pt x="1822347" y="6635841"/>
+                </a:cubicBezTo>
+                <a:lnTo>
+                  <a:pt x="1667815" y="6807260"/>
+                </a:lnTo>
+                <a:lnTo>
+                  <a:pt x="1453812" y="6697654"/>
+                </a:lnTo>
+                <a:cubicBezTo>
+                  <a:pt x="919847" y="6407587"/>
+                  <a:pt x="440444" y="6029808"/>
+                  <a:pt x="34941" y="5583655"/>
+                </a:cubicBezTo>
+                <a:lnTo>
+                  <a:pt x="0" y="5543318"/>
+                </a:lnTo>
+                <a:lnTo>
+                  <a:pt x="2616186" y="2619285"/>
+                </a:lnTo>
+                <a:lnTo>
+                  <a:pt x="2555363" y="2564865"/>
+                </a:lnTo>
+                <a:cubicBezTo>
+                  <a:pt x="2391857" y="2418573"/>
+                  <a:pt x="2377902" y="2167431"/>
+                  <a:pt x="2524193" y="2003925"/>
+                </a:cubicBezTo>
+                <a:cubicBezTo>
+                  <a:pt x="2633913" y="1881295"/>
+                  <a:pt x="2802611" y="1842787"/>
+                  <a:pt x="2949082" y="1892917"/>
+                </a:cubicBezTo>
+                <a:lnTo>
+                  <a:pt x="2967547" y="1901359"/>
+                </a:lnTo>
+                <a:lnTo>
+                  <a:pt x="2967254" y="1896081"/>
+                </a:lnTo>
+                <a:cubicBezTo>
+                  <a:pt x="2912210" y="905501"/>
+                  <a:pt x="3670614" y="57859"/>
+                  <a:pt x="4661193" y="2817"/>
+                </a:cubicBezTo>
+                <a:cubicBezTo>
+                  <a:pt x="4723103" y="-623"/>
+                  <a:pt x="4784457" y="-886"/>
+                  <a:pt x="4845092" y="1888"/>
+                </a:cubicBezTo>
+                <a:close/>
+              </a:path>
+            </a:pathLst>
+          </a:custGeom>
+          <a:solidFill>
+            <a:schemeClr val="bg1"/>
+          </a:solidFill>
+          <a:ln>
+            <a:noFill/>
+          </a:ln>
+        </p:spPr>
+        <p:style>
+          <a:lnRef idx="2">
+            <a:schemeClr val="accent1">
+              <a:shade val="50000"/>
+            </a:schemeClr>
+          </a:lnRef>
+          <a:fillRef idx="1">
+            <a:schemeClr val="accent1"/>
+          </a:fillRef>
+          <a:effectRef idx="0">
+            <a:schemeClr val="accent1"/>
+          </a:effectRef>
+          <a:fontRef idx="minor">
+            <a:schemeClr val="lt1"/>
+          </a:fontRef>
+        </p:style>
+        <p:txBody>
+          <a:bodyPr wrap="square" rtlCol="0" anchor="ctr">
+            <a:noAutofit/>
+          </a:bodyPr>
+          <a:lstStyle/>
+          <a:p>
+            <a:pPr algn="ctr" defTabSz="403228"/>
+            <a:endParaRPr lang="de-DE" sz="1588">
+              <a:solidFill>
+                <a:prstClr val="white"/>
+              </a:solidFill>
+            </a:endParaRPr>
+          </a:p>
+        </p:txBody>
+      </p:sp>
+    </p:spTree>
+    <p:extLst>
+      <p:ext uri="{BB962C8B-B14F-4D97-AF65-F5344CB8AC3E}">
+        <p14:creationId xmlns:p14="http://schemas.microsoft.com/office/powerpoint/2010/main" val="1373590107"/>
+      </p:ext>
+    </p:extLst>
+  </p:cSld>
+  <p:clrMapOvr>
+    <a:masterClrMapping/>
+  </p:clrMapOvr>
+  <p:timing>
+    <p:tnLst>
+      <p:par>
+        <p:cTn id="1" dur="indefinite" restart="never" nodeType="tmRoot"/>
+      </p:par>
+    </p:tnLst>
+  </p:timing>
+</p:sld>
+</file>
+
 <file path=ppt/theme/theme1.xml><?xml version="1.0" encoding="utf-8"?>
 <a:theme xmlns:a="http://schemas.openxmlformats.org/drawingml/2006/main" name="Office">
   <a:themeElements>

</xml_diff>